<commit_message>
Committing new files + changes
</commit_message>
<xml_diff>
--- a/resources/documents/Banner Images.pptx
+++ b/resources/documents/Banner Images.pptx
@@ -24774,125 +24774,110 @@
       </p:sp>
       <p:pic>
         <p:nvPicPr>
-          <p:cNvPr id="1026" name="Picture 2" descr="C:\Users\JESUSC~1\AppData\Local\Temp\SNAGHTML1782c4b.PNG"/>
+          <p:cNvPr id="2" name="Picture 1"/>
           <p:cNvPicPr>
-            <a:picLocks noChangeAspect="1" noChangeArrowheads="1"/>
+            <a:picLocks noChangeAspect="1"/>
           </p:cNvPicPr>
           <p:nvPr/>
         </p:nvPicPr>
         <p:blipFill>
-          <a:blip r:embed="rId2">
-            <a:extLst>
-              <a:ext uri="{28A0092B-C50C-407E-A947-70E740481C1C}">
-                <a14:useLocalDpi xmlns:a14="http://schemas.microsoft.com/office/drawing/2010/main" val="0"/>
-              </a:ext>
-            </a:extLst>
-          </a:blip>
-          <a:srcRect/>
+          <a:blip r:embed="rId2"/>
           <a:stretch>
             <a:fillRect/>
           </a:stretch>
         </p:blipFill>
-        <p:spPr bwMode="auto">
+        <p:spPr>
           <a:xfrm>
-            <a:off x="683622" y="1532681"/>
-            <a:ext cx="4132218" cy="2515804"/>
+            <a:off x="683622" y="1165641"/>
+            <a:ext cx="5879103" cy="3842248"/>
           </a:xfrm>
           <a:prstGeom prst="rect">
             <a:avLst/>
           </a:prstGeom>
-          <a:noFill/>
-          <a:extLst>
-            <a:ext uri="{909E8E84-426E-40DD-AFC4-6F175D3DCCD1}">
-              <a14:hiddenFill xmlns:a14="http://schemas.microsoft.com/office/drawing/2010/main">
-                <a:solidFill>
-                  <a:srgbClr val="FFFFFF"/>
-                </a:solidFill>
-              </a14:hiddenFill>
-            </a:ext>
-          </a:extLst>
+          <a:ln>
+            <a:solidFill>
+              <a:schemeClr val="tx1"/>
+            </a:solidFill>
+          </a:ln>
+          <a:effectLst>
+            <a:outerShdw blurRad="50800" dist="38100" dir="2700000" algn="tl" rotWithShape="0">
+              <a:prstClr val="black">
+                <a:alpha val="40000"/>
+              </a:prstClr>
+            </a:outerShdw>
+          </a:effectLst>
         </p:spPr>
       </p:pic>
       <p:pic>
         <p:nvPicPr>
-          <p:cNvPr id="1032" name="Picture 8" descr="C:\Users\JESUSC~1\AppData\Local\Temp\SNAGHTML179fa06.PNG"/>
+          <p:cNvPr id="3" name="Picture 2"/>
           <p:cNvPicPr>
-            <a:picLocks noChangeAspect="1" noChangeArrowheads="1"/>
+            <a:picLocks noChangeAspect="1"/>
           </p:cNvPicPr>
           <p:nvPr/>
         </p:nvPicPr>
         <p:blipFill>
-          <a:blip r:embed="rId3">
-            <a:extLst>
-              <a:ext uri="{28A0092B-C50C-407E-A947-70E740481C1C}">
-                <a14:useLocalDpi xmlns:a14="http://schemas.microsoft.com/office/drawing/2010/main" val="0"/>
-              </a:ext>
-            </a:extLst>
-          </a:blip>
-          <a:srcRect/>
+          <a:blip r:embed="rId3"/>
           <a:stretch>
             <a:fillRect/>
           </a:stretch>
         </p:blipFill>
-        <p:spPr bwMode="auto">
+        <p:spPr>
           <a:xfrm>
-            <a:off x="2955993" y="2485783"/>
-            <a:ext cx="3569468" cy="3445313"/>
+            <a:off x="3193168" y="1863645"/>
+            <a:ext cx="5080790" cy="3996688"/>
           </a:xfrm>
           <a:prstGeom prst="rect">
             <a:avLst/>
           </a:prstGeom>
-          <a:noFill/>
-          <a:extLst>
-            <a:ext uri="{909E8E84-426E-40DD-AFC4-6F175D3DCCD1}">
-              <a14:hiddenFill xmlns:a14="http://schemas.microsoft.com/office/drawing/2010/main">
-                <a:solidFill>
-                  <a:srgbClr val="FFFFFF"/>
-                </a:solidFill>
-              </a14:hiddenFill>
-            </a:ext>
-          </a:extLst>
+          <a:ln>
+            <a:solidFill>
+              <a:schemeClr val="tx1"/>
+            </a:solidFill>
+          </a:ln>
+          <a:effectLst>
+            <a:outerShdw blurRad="50800" dist="38100" dir="2700000" algn="tl" rotWithShape="0">
+              <a:prstClr val="black">
+                <a:alpha val="40000"/>
+              </a:prstClr>
+            </a:outerShdw>
+          </a:effectLst>
         </p:spPr>
       </p:pic>
       <p:pic>
         <p:nvPicPr>
-          <p:cNvPr id="1034" name="Picture 10" descr="C:\Users\JESUSC~1\AppData\Local\Temp\SNAGHTML17b3cb7.PNG"/>
+          <p:cNvPr id="4" name="Picture 3"/>
           <p:cNvPicPr>
-            <a:picLocks noChangeAspect="1" noChangeArrowheads="1"/>
+            <a:picLocks noChangeAspect="1"/>
           </p:cNvPicPr>
           <p:nvPr/>
         </p:nvPicPr>
         <p:blipFill>
-          <a:blip r:embed="rId4">
-            <a:extLst>
-              <a:ext uri="{28A0092B-C50C-407E-A947-70E740481C1C}">
-                <a14:useLocalDpi xmlns:a14="http://schemas.microsoft.com/office/drawing/2010/main" val="0"/>
-              </a:ext>
-            </a:extLst>
-          </a:blip>
-          <a:srcRect/>
+          <a:blip r:embed="rId4"/>
           <a:stretch>
             <a:fillRect/>
           </a:stretch>
         </p:blipFill>
-        <p:spPr bwMode="auto">
+        <p:spPr>
           <a:xfrm>
-            <a:off x="5535291" y="1788679"/>
-            <a:ext cx="6323334" cy="2995613"/>
+            <a:off x="6238427" y="2337216"/>
+            <a:ext cx="5286688" cy="4032661"/>
           </a:xfrm>
           <a:prstGeom prst="rect">
             <a:avLst/>
           </a:prstGeom>
-          <a:noFill/>
-          <a:extLst>
-            <a:ext uri="{909E8E84-426E-40DD-AFC4-6F175D3DCCD1}">
-              <a14:hiddenFill xmlns:a14="http://schemas.microsoft.com/office/drawing/2010/main">
-                <a:solidFill>
-                  <a:srgbClr val="FFFFFF"/>
-                </a:solidFill>
-              </a14:hiddenFill>
-            </a:ext>
-          </a:extLst>
+          <a:ln>
+            <a:solidFill>
+              <a:schemeClr val="tx1"/>
+            </a:solidFill>
+          </a:ln>
+          <a:effectLst>
+            <a:outerShdw blurRad="50800" dist="38100" dir="2700000" algn="tl" rotWithShape="0">
+              <a:prstClr val="black">
+                <a:alpha val="40000"/>
+              </a:prstClr>
+            </a:outerShdw>
+          </a:effectLst>
         </p:spPr>
       </p:pic>
     </p:spTree>
@@ -25008,12 +24993,24 @@
         </p:blipFill>
         <p:spPr>
           <a:xfrm>
-            <a:off x="1312272" y="1238249"/>
+            <a:off x="683622" y="1217281"/>
             <a:ext cx="3923608" cy="4156963"/>
           </a:xfrm>
           <a:prstGeom prst="rect">
             <a:avLst/>
           </a:prstGeom>
+          <a:ln>
+            <a:solidFill>
+              <a:schemeClr val="tx1"/>
+            </a:solidFill>
+          </a:ln>
+          <a:effectLst>
+            <a:outerShdw blurRad="50800" dist="38100" dir="2700000" algn="tl" rotWithShape="0">
+              <a:prstClr val="black">
+                <a:alpha val="40000"/>
+              </a:prstClr>
+            </a:outerShdw>
+          </a:effectLst>
         </p:spPr>
       </p:pic>
       <p:pic>
@@ -25032,12 +25029,24 @@
         </p:blipFill>
         <p:spPr>
           <a:xfrm>
-            <a:off x="6286175" y="784124"/>
+            <a:off x="7105864" y="1217281"/>
             <a:ext cx="4698388" cy="3835030"/>
           </a:xfrm>
           <a:prstGeom prst="rect">
             <a:avLst/>
           </a:prstGeom>
+          <a:ln>
+            <a:solidFill>
+              <a:schemeClr val="tx1"/>
+            </a:solidFill>
+          </a:ln>
+          <a:effectLst>
+            <a:outerShdw blurRad="50800" dist="38100" dir="2700000" algn="tl" rotWithShape="0">
+              <a:prstClr val="black">
+                <a:alpha val="40000"/>
+              </a:prstClr>
+            </a:outerShdw>
+          </a:effectLst>
         </p:spPr>
       </p:pic>
       <p:pic>
@@ -25056,12 +25065,24 @@
         </p:blipFill>
         <p:spPr>
           <a:xfrm>
-            <a:off x="4160241" y="1962150"/>
+            <a:off x="3588163" y="1866900"/>
             <a:ext cx="4571783" cy="4067422"/>
           </a:xfrm>
           <a:prstGeom prst="rect">
             <a:avLst/>
           </a:prstGeom>
+          <a:ln>
+            <a:solidFill>
+              <a:schemeClr val="tx1"/>
+            </a:solidFill>
+          </a:ln>
+          <a:effectLst>
+            <a:outerShdw blurRad="50800" dist="38100" dir="2700000" algn="tl" rotWithShape="0">
+              <a:prstClr val="black">
+                <a:alpha val="40000"/>
+              </a:prstClr>
+            </a:outerShdw>
+          </a:effectLst>
         </p:spPr>
       </p:pic>
     </p:spTree>

</xml_diff>